<commit_message>
pptx for 2 lessons fixed
</commit_message>
<xml_diff>
--- a/t-07-avl-tree/תרגול 7.pptx
+++ b/t-07-avl-tree/תרגול 7.pptx
@@ -5,7 +5,7 @@
     <p:sldMasterId id="2147483648" r:id="rId1"/>
   </p:sldMasterIdLst>
   <p:notesMasterIdLst>
-    <p:notesMasterId r:id="rId24"/>
+    <p:notesMasterId r:id="rId22"/>
   </p:notesMasterIdLst>
   <p:sldIdLst>
     <p:sldId id="257" r:id="rId2"/>
@@ -27,9 +27,7 @@
     <p:sldId id="282" r:id="rId18"/>
     <p:sldId id="301" r:id="rId19"/>
     <p:sldId id="302" r:id="rId20"/>
-    <p:sldId id="303" r:id="rId21"/>
-    <p:sldId id="304" r:id="rId22"/>
-    <p:sldId id="259" r:id="rId23"/>
+    <p:sldId id="259" r:id="rId21"/>
   </p:sldIdLst>
   <p:sldSz cx="12192000" cy="6858000"/>
   <p:notesSz cx="6858000" cy="9144000"/>
@@ -218,7 +216,7 @@
           <a:p>
             <a:fld id="{C267593B-B963-47D8-A2A4-BA759CBCEAC5}" type="datetimeFigureOut">
               <a:rPr lang="en-US" smtClean="0"/>
-              <a:t>3/2/24</a:t>
+              <a:t>3/4/24</a:t>
             </a:fld>
             <a:endParaRPr lang="en-US"/>
           </a:p>
@@ -1244,176 +1242,6 @@
 </p:notes>
 </file>
 
-<file path=ppt/notesSlides/notesSlide18.xml><?xml version="1.0" encoding="utf-8"?>
-<p:notes xmlns:a="http://schemas.openxmlformats.org/drawingml/2006/main" xmlns:r="http://schemas.openxmlformats.org/officeDocument/2006/relationships" xmlns:p="http://schemas.openxmlformats.org/presentationml/2006/main">
-  <p:cSld>
-    <p:spTree>
-      <p:nvGrpSpPr>
-        <p:cNvPr id="1" name=""/>
-        <p:cNvGrpSpPr/>
-        <p:nvPr/>
-      </p:nvGrpSpPr>
-      <p:grpSpPr>
-        <a:xfrm>
-          <a:off x="0" y="0"/>
-          <a:ext cx="0" cy="0"/>
-          <a:chOff x="0" y="0"/>
-          <a:chExt cx="0" cy="0"/>
-        </a:xfrm>
-      </p:grpSpPr>
-      <p:sp>
-        <p:nvSpPr>
-          <p:cNvPr id="2" name="Slide Image Placeholder 1"/>
-          <p:cNvSpPr>
-            <a:spLocks noGrp="1" noRot="1" noChangeAspect="1"/>
-          </p:cNvSpPr>
-          <p:nvPr>
-            <p:ph type="sldImg"/>
-          </p:nvPr>
-        </p:nvSpPr>
-        <p:spPr/>
-      </p:sp>
-      <p:sp>
-        <p:nvSpPr>
-          <p:cNvPr id="3" name="Notes Placeholder 2"/>
-          <p:cNvSpPr>
-            <a:spLocks noGrp="1"/>
-          </p:cNvSpPr>
-          <p:nvPr>
-            <p:ph type="body" idx="1"/>
-          </p:nvPr>
-        </p:nvSpPr>
-        <p:spPr/>
-        <p:txBody>
-          <a:bodyPr/>
-          <a:lstStyle/>
-          <a:p>
-            <a:pPr marL="0" algn="r" defTabSz="914400" rtl="1" eaLnBrk="1" latinLnBrk="0" hangingPunct="1"/>
-            <a:endParaRPr lang="en-US" dirty="0"/>
-          </a:p>
-        </p:txBody>
-      </p:sp>
-      <p:sp>
-        <p:nvSpPr>
-          <p:cNvPr id="4" name="Slide Number Placeholder 3"/>
-          <p:cNvSpPr>
-            <a:spLocks noGrp="1"/>
-          </p:cNvSpPr>
-          <p:nvPr>
-            <p:ph type="sldNum" sz="quarter" idx="5"/>
-          </p:nvPr>
-        </p:nvSpPr>
-        <p:spPr/>
-        <p:txBody>
-          <a:bodyPr/>
-          <a:lstStyle/>
-          <a:p>
-            <a:fld id="{72391380-8262-4EC7-BAB8-26F58A320275}" type="slidenum">
-              <a:rPr lang="en-US" smtClean="0"/>
-              <a:t>20</a:t>
-            </a:fld>
-            <a:endParaRPr lang="en-US"/>
-          </a:p>
-        </p:txBody>
-      </p:sp>
-    </p:spTree>
-    <p:extLst>
-      <p:ext uri="{BB962C8B-B14F-4D97-AF65-F5344CB8AC3E}">
-        <p14:creationId xmlns:p14="http://schemas.microsoft.com/office/powerpoint/2010/main" val="189497205"/>
-      </p:ext>
-    </p:extLst>
-  </p:cSld>
-  <p:clrMapOvr>
-    <a:masterClrMapping/>
-  </p:clrMapOvr>
-</p:notes>
-</file>
-
-<file path=ppt/notesSlides/notesSlide19.xml><?xml version="1.0" encoding="utf-8"?>
-<p:notes xmlns:a="http://schemas.openxmlformats.org/drawingml/2006/main" xmlns:r="http://schemas.openxmlformats.org/officeDocument/2006/relationships" xmlns:p="http://schemas.openxmlformats.org/presentationml/2006/main">
-  <p:cSld>
-    <p:spTree>
-      <p:nvGrpSpPr>
-        <p:cNvPr id="1" name=""/>
-        <p:cNvGrpSpPr/>
-        <p:nvPr/>
-      </p:nvGrpSpPr>
-      <p:grpSpPr>
-        <a:xfrm>
-          <a:off x="0" y="0"/>
-          <a:ext cx="0" cy="0"/>
-          <a:chOff x="0" y="0"/>
-          <a:chExt cx="0" cy="0"/>
-        </a:xfrm>
-      </p:grpSpPr>
-      <p:sp>
-        <p:nvSpPr>
-          <p:cNvPr id="2" name="Slide Image Placeholder 1"/>
-          <p:cNvSpPr>
-            <a:spLocks noGrp="1" noRot="1" noChangeAspect="1"/>
-          </p:cNvSpPr>
-          <p:nvPr>
-            <p:ph type="sldImg"/>
-          </p:nvPr>
-        </p:nvSpPr>
-        <p:spPr/>
-      </p:sp>
-      <p:sp>
-        <p:nvSpPr>
-          <p:cNvPr id="3" name="Notes Placeholder 2"/>
-          <p:cNvSpPr>
-            <a:spLocks noGrp="1"/>
-          </p:cNvSpPr>
-          <p:nvPr>
-            <p:ph type="body" idx="1"/>
-          </p:nvPr>
-        </p:nvSpPr>
-        <p:spPr/>
-        <p:txBody>
-          <a:bodyPr/>
-          <a:lstStyle/>
-          <a:p>
-            <a:pPr marL="0" algn="r" defTabSz="914400" rtl="1" eaLnBrk="1" latinLnBrk="0" hangingPunct="1"/>
-            <a:endParaRPr lang="en-US" dirty="0"/>
-          </a:p>
-        </p:txBody>
-      </p:sp>
-      <p:sp>
-        <p:nvSpPr>
-          <p:cNvPr id="4" name="Slide Number Placeholder 3"/>
-          <p:cNvSpPr>
-            <a:spLocks noGrp="1"/>
-          </p:cNvSpPr>
-          <p:nvPr>
-            <p:ph type="sldNum" sz="quarter" idx="5"/>
-          </p:nvPr>
-        </p:nvSpPr>
-        <p:spPr/>
-        <p:txBody>
-          <a:bodyPr/>
-          <a:lstStyle/>
-          <a:p>
-            <a:fld id="{72391380-8262-4EC7-BAB8-26F58A320275}" type="slidenum">
-              <a:rPr lang="en-US" smtClean="0"/>
-              <a:t>21</a:t>
-            </a:fld>
-            <a:endParaRPr lang="en-US"/>
-          </a:p>
-        </p:txBody>
-      </p:sp>
-    </p:spTree>
-    <p:extLst>
-      <p:ext uri="{BB962C8B-B14F-4D97-AF65-F5344CB8AC3E}">
-        <p14:creationId xmlns:p14="http://schemas.microsoft.com/office/powerpoint/2010/main" val="1133212925"/>
-      </p:ext>
-    </p:extLst>
-  </p:cSld>
-  <p:clrMapOvr>
-    <a:masterClrMapping/>
-  </p:clrMapOvr>
-</p:notes>
-</file>
-
 <file path=ppt/notesSlides/notesSlide2.xml><?xml version="1.0" encoding="utf-8"?>
 <p:notes xmlns:a="http://schemas.openxmlformats.org/drawingml/2006/main" xmlns:r="http://schemas.openxmlformats.org/officeDocument/2006/relationships" xmlns:p="http://schemas.openxmlformats.org/presentationml/2006/main">
   <p:cSld>
@@ -2233,7 +2061,7 @@
           <a:p>
             <a:fld id="{9FBD9C55-7868-4FF1-8666-2EC1F88A96B2}" type="datetimeFigureOut">
               <a:rPr lang="he-IL" smtClean="0"/>
-              <a:t>כ"ב.אדר א.תשפ"ד</a:t>
+              <a:t>כ"ד.אדר א.תשפ"ד</a:t>
             </a:fld>
             <a:endParaRPr lang="he-IL"/>
           </a:p>
@@ -2431,7 +2259,7 @@
           <a:p>
             <a:fld id="{9FBD9C55-7868-4FF1-8666-2EC1F88A96B2}" type="datetimeFigureOut">
               <a:rPr lang="he-IL" smtClean="0"/>
-              <a:t>כ"ב.אדר א.תשפ"ד</a:t>
+              <a:t>כ"ד.אדר א.תשפ"ד</a:t>
             </a:fld>
             <a:endParaRPr lang="he-IL"/>
           </a:p>
@@ -2639,7 +2467,7 @@
           <a:p>
             <a:fld id="{9FBD9C55-7868-4FF1-8666-2EC1F88A96B2}" type="datetimeFigureOut">
               <a:rPr lang="he-IL" smtClean="0"/>
-              <a:t>כ"ב.אדר א.תשפ"ד</a:t>
+              <a:t>כ"ד.אדר א.תשפ"ד</a:t>
             </a:fld>
             <a:endParaRPr lang="he-IL"/>
           </a:p>
@@ -2837,7 +2665,7 @@
           <a:p>
             <a:fld id="{9FBD9C55-7868-4FF1-8666-2EC1F88A96B2}" type="datetimeFigureOut">
               <a:rPr lang="he-IL" smtClean="0"/>
-              <a:t>כ"ב.אדר א.תשפ"ד</a:t>
+              <a:t>כ"ד.אדר א.תשפ"ד</a:t>
             </a:fld>
             <a:endParaRPr lang="he-IL"/>
           </a:p>
@@ -3112,7 +2940,7 @@
           <a:p>
             <a:fld id="{9FBD9C55-7868-4FF1-8666-2EC1F88A96B2}" type="datetimeFigureOut">
               <a:rPr lang="he-IL" smtClean="0"/>
-              <a:t>כ"ב.אדר א.תשפ"ד</a:t>
+              <a:t>כ"ד.אדר א.תשפ"ד</a:t>
             </a:fld>
             <a:endParaRPr lang="he-IL"/>
           </a:p>
@@ -3377,7 +3205,7 @@
           <a:p>
             <a:fld id="{9FBD9C55-7868-4FF1-8666-2EC1F88A96B2}" type="datetimeFigureOut">
               <a:rPr lang="he-IL" smtClean="0"/>
-              <a:t>כ"ב.אדר א.תשפ"ד</a:t>
+              <a:t>כ"ד.אדר א.תשפ"ד</a:t>
             </a:fld>
             <a:endParaRPr lang="he-IL"/>
           </a:p>
@@ -3789,7 +3617,7 @@
           <a:p>
             <a:fld id="{9FBD9C55-7868-4FF1-8666-2EC1F88A96B2}" type="datetimeFigureOut">
               <a:rPr lang="he-IL" smtClean="0"/>
-              <a:t>כ"ב.אדר א.תשפ"ד</a:t>
+              <a:t>כ"ד.אדר א.תשפ"ד</a:t>
             </a:fld>
             <a:endParaRPr lang="he-IL"/>
           </a:p>
@@ -3930,7 +3758,7 @@
           <a:p>
             <a:fld id="{9FBD9C55-7868-4FF1-8666-2EC1F88A96B2}" type="datetimeFigureOut">
               <a:rPr lang="he-IL" smtClean="0"/>
-              <a:t>כ"ב.אדר א.תשפ"ד</a:t>
+              <a:t>כ"ד.אדר א.תשפ"ד</a:t>
             </a:fld>
             <a:endParaRPr lang="he-IL"/>
           </a:p>
@@ -4043,7 +3871,7 @@
           <a:p>
             <a:fld id="{9FBD9C55-7868-4FF1-8666-2EC1F88A96B2}" type="datetimeFigureOut">
               <a:rPr lang="he-IL" smtClean="0"/>
-              <a:t>כ"ב.אדר א.תשפ"ד</a:t>
+              <a:t>כ"ד.אדר א.תשפ"ד</a:t>
             </a:fld>
             <a:endParaRPr lang="he-IL"/>
           </a:p>
@@ -4354,7 +4182,7 @@
           <a:p>
             <a:fld id="{9FBD9C55-7868-4FF1-8666-2EC1F88A96B2}" type="datetimeFigureOut">
               <a:rPr lang="he-IL" smtClean="0"/>
-              <a:t>כ"ב.אדר א.תשפ"ד</a:t>
+              <a:t>כ"ד.אדר א.תשפ"ד</a:t>
             </a:fld>
             <a:endParaRPr lang="he-IL"/>
           </a:p>
@@ -4642,7 +4470,7 @@
           <a:p>
             <a:fld id="{9FBD9C55-7868-4FF1-8666-2EC1F88A96B2}" type="datetimeFigureOut">
               <a:rPr lang="he-IL" smtClean="0"/>
-              <a:t>כ"ב.אדר א.תשפ"ד</a:t>
+              <a:t>כ"ד.אדר א.תשפ"ד</a:t>
             </a:fld>
             <a:endParaRPr lang="he-IL"/>
           </a:p>
@@ -4883,7 +4711,7 @@
           <a:p>
             <a:fld id="{9FBD9C55-7868-4FF1-8666-2EC1F88A96B2}" type="datetimeFigureOut">
               <a:rPr lang="he-IL" smtClean="0"/>
-              <a:t>כ"ב.אדר א.תשפ"ד</a:t>
+              <a:t>כ"ד.אדר א.תשפ"ד</a:t>
             </a:fld>
             <a:endParaRPr lang="he-IL"/>
           </a:p>
@@ -15354,466 +15182,6 @@
     <p:bg>
       <p:bgPr>
         <a:blipFill dpi="0" rotWithShape="1">
-          <a:blip r:embed="rId3">
-            <a:lum/>
-          </a:blip>
-          <a:srcRect/>
-          <a:stretch>
-            <a:fillRect/>
-          </a:stretch>
-        </a:blipFill>
-        <a:effectLst/>
-      </p:bgPr>
-    </p:bg>
-    <p:spTree>
-      <p:nvGrpSpPr>
-        <p:cNvPr id="1" name=""/>
-        <p:cNvGrpSpPr/>
-        <p:nvPr/>
-      </p:nvGrpSpPr>
-      <p:grpSpPr>
-        <a:xfrm>
-          <a:off x="0" y="0"/>
-          <a:ext cx="0" cy="0"/>
-          <a:chOff x="0" y="0"/>
-          <a:chExt cx="0" cy="0"/>
-        </a:xfrm>
-      </p:grpSpPr>
-      <p:sp>
-        <p:nvSpPr>
-          <p:cNvPr id="10" name="TextBox 9"/>
-          <p:cNvSpPr txBox="1"/>
-          <p:nvPr/>
-        </p:nvSpPr>
-        <p:spPr>
-          <a:xfrm>
-            <a:off x="1803126" y="522147"/>
-            <a:ext cx="8988703" cy="769441"/>
-          </a:xfrm>
-          <a:prstGeom prst="rect">
-            <a:avLst/>
-          </a:prstGeom>
-          <a:noFill/>
-        </p:spPr>
-        <p:txBody>
-          <a:bodyPr wrap="square" rtlCol="1">
-            <a:spAutoFit/>
-          </a:bodyPr>
-          <a:lstStyle/>
-          <a:p>
-            <a:pPr fontAlgn="base">
-              <a:spcBef>
-                <a:spcPct val="0"/>
-              </a:spcBef>
-              <a:spcAft>
-                <a:spcPct val="0"/>
-              </a:spcAft>
-              <a:defRPr/>
-            </a:pPr>
-            <a:r>
-              <a:rPr lang="he-IL" sz="4200" b="1" kern="0" dirty="0">
-                <a:solidFill>
-                  <a:srgbClr val="006633"/>
-                </a:solidFill>
-                <a:latin typeface="Garamond"/>
-                <a:ea typeface="+mj-ea"/>
-                <a:cs typeface="Arial"/>
-              </a:rPr>
-              <a:t>שאלה 7 - </a:t>
-            </a:r>
-            <a:r>
-              <a:rPr lang="en-US" sz="4200" b="1" kern="0" dirty="0">
-                <a:solidFill>
-                  <a:srgbClr val="006633"/>
-                </a:solidFill>
-                <a:latin typeface="Garamond"/>
-                <a:ea typeface="+mj-ea"/>
-                <a:cs typeface="Arial"/>
-              </a:rPr>
-              <a:t>Interview</a:t>
-            </a:r>
-            <a:r>
-              <a:rPr lang="en-US" sz="4400" b="0" i="0" dirty="0">
-                <a:solidFill>
-                  <a:srgbClr val="1A202C"/>
-                </a:solidFill>
-                <a:effectLst/>
-                <a:latin typeface="Avenir Demi" panose="02000503020000020003" pitchFamily="2" charset="0"/>
-              </a:rPr>
-              <a:t> </a:t>
-            </a:r>
-            <a:r>
-              <a:rPr lang="en-US" sz="4200" b="1" kern="0" dirty="0">
-                <a:solidFill>
-                  <a:srgbClr val="006633"/>
-                </a:solidFill>
-                <a:latin typeface="Garamond"/>
-                <a:ea typeface="+mj-ea"/>
-                <a:cs typeface="Arial"/>
-              </a:rPr>
-              <a:t>Questions</a:t>
-            </a:r>
-          </a:p>
-        </p:txBody>
-      </p:sp>
-      <p:sp>
-        <p:nvSpPr>
-          <p:cNvPr id="5" name="TextBox 4">
-            <a:extLst>
-              <a:ext uri="{FF2B5EF4-FFF2-40B4-BE49-F238E27FC236}">
-                <a16:creationId xmlns:a16="http://schemas.microsoft.com/office/drawing/2014/main" id="{B8B00C37-FE97-C308-25F1-9B7A697B3E79}"/>
-              </a:ext>
-            </a:extLst>
-          </p:cNvPr>
-          <p:cNvSpPr txBox="1"/>
-          <p:nvPr/>
-        </p:nvSpPr>
-        <p:spPr>
-          <a:xfrm>
-            <a:off x="842231" y="1793337"/>
-            <a:ext cx="10507537" cy="830997"/>
-          </a:xfrm>
-          <a:prstGeom prst="rect">
-            <a:avLst/>
-          </a:prstGeom>
-          <a:noFill/>
-        </p:spPr>
-        <p:txBody>
-          <a:bodyPr wrap="square">
-            <a:spAutoFit/>
-          </a:bodyPr>
-          <a:lstStyle/>
-          <a:p>
-            <a:pPr algn="l"/>
-            <a:r>
-              <a:rPr lang="en-US" sz="2400" b="0" i="0" dirty="0">
-                <a:solidFill>
-                  <a:srgbClr val="1A202C"/>
-                </a:solidFill>
-                <a:effectLst/>
-                <a:latin typeface="Avenir Demi" panose="02000503020000020003" pitchFamily="2" charset="0"/>
-              </a:rPr>
-              <a:t>Describe how AVL Trees are modified to support operations like finding the minimum, maximum or k-</a:t>
-            </a:r>
-            <a:r>
-              <a:rPr lang="en-US" sz="2400" b="0" i="0" dirty="0" err="1">
-                <a:solidFill>
-                  <a:srgbClr val="1A202C"/>
-                </a:solidFill>
-                <a:effectLst/>
-                <a:latin typeface="Avenir Demi" panose="02000503020000020003" pitchFamily="2" charset="0"/>
-              </a:rPr>
-              <a:t>th</a:t>
-            </a:r>
-            <a:r>
-              <a:rPr lang="en-US" sz="2400" b="0" i="0" dirty="0">
-                <a:solidFill>
-                  <a:srgbClr val="1A202C"/>
-                </a:solidFill>
-                <a:effectLst/>
-                <a:latin typeface="Avenir Demi" panose="02000503020000020003" pitchFamily="2" charset="0"/>
-              </a:rPr>
-              <a:t> smallest element efficiently.</a:t>
-            </a:r>
-          </a:p>
-        </p:txBody>
-      </p:sp>
-    </p:spTree>
-    <p:extLst>
-      <p:ext uri="{BB962C8B-B14F-4D97-AF65-F5344CB8AC3E}">
-        <p14:creationId xmlns:p14="http://schemas.microsoft.com/office/powerpoint/2010/main" val="2970910964"/>
-      </p:ext>
-    </p:extLst>
-  </p:cSld>
-  <p:clrMapOvr>
-    <a:masterClrMapping/>
-  </p:clrMapOvr>
-</p:sld>
-</file>
-
-<file path=ppt/slides/slide21.xml><?xml version="1.0" encoding="utf-8"?>
-<p:sld xmlns:a="http://schemas.openxmlformats.org/drawingml/2006/main" xmlns:r="http://schemas.openxmlformats.org/officeDocument/2006/relationships" xmlns:p="http://schemas.openxmlformats.org/presentationml/2006/main">
-  <p:cSld>
-    <p:bg>
-      <p:bgPr>
-        <a:blipFill dpi="0" rotWithShape="1">
-          <a:blip r:embed="rId3">
-            <a:lum/>
-          </a:blip>
-          <a:srcRect/>
-          <a:stretch>
-            <a:fillRect/>
-          </a:stretch>
-        </a:blipFill>
-        <a:effectLst/>
-      </p:bgPr>
-    </p:bg>
-    <p:spTree>
-      <p:nvGrpSpPr>
-        <p:cNvPr id="1" name=""/>
-        <p:cNvGrpSpPr/>
-        <p:nvPr/>
-      </p:nvGrpSpPr>
-      <p:grpSpPr>
-        <a:xfrm>
-          <a:off x="0" y="0"/>
-          <a:ext cx="0" cy="0"/>
-          <a:chOff x="0" y="0"/>
-          <a:chExt cx="0" cy="0"/>
-        </a:xfrm>
-      </p:grpSpPr>
-      <p:sp>
-        <p:nvSpPr>
-          <p:cNvPr id="10" name="TextBox 9"/>
-          <p:cNvSpPr txBox="1"/>
-          <p:nvPr/>
-        </p:nvSpPr>
-        <p:spPr>
-          <a:xfrm>
-            <a:off x="7004679" y="362749"/>
-            <a:ext cx="4169285" cy="738664"/>
-          </a:xfrm>
-          <a:prstGeom prst="rect">
-            <a:avLst/>
-          </a:prstGeom>
-          <a:noFill/>
-        </p:spPr>
-        <p:txBody>
-          <a:bodyPr wrap="square" rtlCol="1">
-            <a:spAutoFit/>
-          </a:bodyPr>
-          <a:lstStyle/>
-          <a:p>
-            <a:pPr fontAlgn="base">
-              <a:spcBef>
-                <a:spcPct val="0"/>
-              </a:spcBef>
-              <a:spcAft>
-                <a:spcPct val="0"/>
-              </a:spcAft>
-              <a:defRPr/>
-            </a:pPr>
-            <a:r>
-              <a:rPr lang="he-IL" sz="4200" b="1" kern="0" dirty="0">
-                <a:solidFill>
-                  <a:srgbClr val="006633"/>
-                </a:solidFill>
-                <a:latin typeface="Garamond"/>
-                <a:ea typeface="+mj-ea"/>
-                <a:cs typeface="Arial"/>
-              </a:rPr>
-              <a:t>שאלה </a:t>
-            </a:r>
-            <a:r>
-              <a:rPr lang="en-US" sz="4200" b="1" kern="0" dirty="0">
-                <a:solidFill>
-                  <a:srgbClr val="006633"/>
-                </a:solidFill>
-                <a:latin typeface="Garamond"/>
-                <a:ea typeface="+mj-ea"/>
-                <a:cs typeface="Arial"/>
-              </a:rPr>
-              <a:t>7</a:t>
-            </a:r>
-            <a:r>
-              <a:rPr lang="he-IL" sz="4200" b="1" kern="0" dirty="0">
-                <a:solidFill>
-                  <a:srgbClr val="006633"/>
-                </a:solidFill>
-                <a:latin typeface="Garamond"/>
-                <a:ea typeface="+mj-ea"/>
-                <a:cs typeface="Arial"/>
-              </a:rPr>
-              <a:t> פתרון</a:t>
-            </a:r>
-            <a:endParaRPr lang="en-US" sz="4200" b="1" kern="0" dirty="0">
-              <a:solidFill>
-                <a:srgbClr val="006633"/>
-              </a:solidFill>
-              <a:latin typeface="Garamond"/>
-              <a:ea typeface="+mj-ea"/>
-              <a:cs typeface="Arial"/>
-            </a:endParaRPr>
-          </a:p>
-        </p:txBody>
-      </p:sp>
-      <p:sp>
-        <p:nvSpPr>
-          <p:cNvPr id="3" name="TextBox 2">
-            <a:extLst>
-              <a:ext uri="{FF2B5EF4-FFF2-40B4-BE49-F238E27FC236}">
-                <a16:creationId xmlns:a16="http://schemas.microsoft.com/office/drawing/2014/main" id="{FE4B9442-88E5-BA68-82B0-142DED7FBA51}"/>
-              </a:ext>
-            </a:extLst>
-          </p:cNvPr>
-          <p:cNvSpPr txBox="1"/>
-          <p:nvPr/>
-        </p:nvSpPr>
-        <p:spPr>
-          <a:xfrm>
-            <a:off x="616056" y="1447715"/>
-            <a:ext cx="11405461" cy="4893647"/>
-          </a:xfrm>
-          <a:prstGeom prst="rect">
-            <a:avLst/>
-          </a:prstGeom>
-          <a:noFill/>
-        </p:spPr>
-        <p:txBody>
-          <a:bodyPr wrap="square">
-            <a:spAutoFit/>
-          </a:bodyPr>
-          <a:lstStyle/>
-          <a:p>
-            <a:pPr algn="l"/>
-            <a:r>
-              <a:rPr lang="en-US" sz="2400" dirty="0">
-                <a:solidFill>
-                  <a:srgbClr val="1A202C"/>
-                </a:solidFill>
-                <a:latin typeface="Avenir Demi" panose="02000503020000020003" pitchFamily="2" charset="0"/>
-              </a:rPr>
-              <a:t>To support finding minimum, maximum, or k-</a:t>
-            </a:r>
-            <a:r>
-              <a:rPr lang="en-US" sz="2400" dirty="0" err="1">
-                <a:solidFill>
-                  <a:srgbClr val="1A202C"/>
-                </a:solidFill>
-                <a:latin typeface="Avenir Demi" panose="02000503020000020003" pitchFamily="2" charset="0"/>
-              </a:rPr>
-              <a:t>th</a:t>
-            </a:r>
-            <a:r>
-              <a:rPr lang="en-US" sz="2400" dirty="0">
-                <a:solidFill>
-                  <a:srgbClr val="1A202C"/>
-                </a:solidFill>
-                <a:latin typeface="Avenir Demi" panose="02000503020000020003" pitchFamily="2" charset="0"/>
-              </a:rPr>
-              <a:t> smallest elements efficiently, AVL Trees utilize the following modifications:</a:t>
-            </a:r>
-          </a:p>
-          <a:p>
-            <a:pPr algn="l"/>
-            <a:r>
-              <a:rPr lang="en-US" sz="2400" dirty="0">
-                <a:solidFill>
-                  <a:srgbClr val="1A202C"/>
-                </a:solidFill>
-                <a:latin typeface="Avenir Demi" panose="02000503020000020003" pitchFamily="2" charset="0"/>
-              </a:rPr>
-              <a:t>1. Store subtree size: Each node stores the number of nodes in its subtree, including itself. This helps determine the rank of an element and find the k-</a:t>
-            </a:r>
-            <a:r>
-              <a:rPr lang="en-US" sz="2400" dirty="0" err="1">
-                <a:solidFill>
-                  <a:srgbClr val="1A202C"/>
-                </a:solidFill>
-                <a:latin typeface="Avenir Demi" panose="02000503020000020003" pitchFamily="2" charset="0"/>
-              </a:rPr>
-              <a:t>th</a:t>
-            </a:r>
-            <a:r>
-              <a:rPr lang="en-US" sz="2400" dirty="0">
-                <a:solidFill>
-                  <a:srgbClr val="1A202C"/>
-                </a:solidFill>
-                <a:latin typeface="Avenir Demi" panose="02000503020000020003" pitchFamily="2" charset="0"/>
-              </a:rPr>
-              <a:t> smallest element.</a:t>
-            </a:r>
-            <a:br>
-              <a:rPr lang="en-US" sz="2400" dirty="0">
-                <a:solidFill>
-                  <a:srgbClr val="1A202C"/>
-                </a:solidFill>
-                <a:latin typeface="Avenir Demi" panose="02000503020000020003" pitchFamily="2" charset="0"/>
-              </a:rPr>
-            </a:br>
-            <a:r>
-              <a:rPr lang="en-US" sz="2400" dirty="0">
-                <a:solidFill>
-                  <a:srgbClr val="1A202C"/>
-                </a:solidFill>
-                <a:latin typeface="Avenir Demi" panose="02000503020000020003" pitchFamily="2" charset="0"/>
-              </a:rPr>
-              <a:t>2. Update subtree sizes: When performing rotations (single or double) during insertion or deletion, update the subtree sizes accordingly for affected nodes.</a:t>
-            </a:r>
-            <a:br>
-              <a:rPr lang="en-US" sz="2400" dirty="0">
-                <a:solidFill>
-                  <a:srgbClr val="1A202C"/>
-                </a:solidFill>
-                <a:latin typeface="Avenir Demi" panose="02000503020000020003" pitchFamily="2" charset="0"/>
-              </a:rPr>
-            </a:br>
-            <a:r>
-              <a:rPr lang="en-US" sz="2400" dirty="0">
-                <a:solidFill>
-                  <a:srgbClr val="1A202C"/>
-                </a:solidFill>
-                <a:latin typeface="Avenir Demi" panose="02000503020000020003" pitchFamily="2" charset="0"/>
-              </a:rPr>
-              <a:t>3. Find minimum/maximum: Traverse left/right from the root until a null child is reached; this takes O(log n) time due to height balancing.</a:t>
-            </a:r>
-            <a:br>
-              <a:rPr lang="en-US" sz="2400" dirty="0">
-                <a:solidFill>
-                  <a:srgbClr val="1A202C"/>
-                </a:solidFill>
-                <a:latin typeface="Avenir Demi" panose="02000503020000020003" pitchFamily="2" charset="0"/>
-              </a:rPr>
-            </a:br>
-            <a:r>
-              <a:rPr lang="en-US" sz="2400" dirty="0">
-                <a:solidFill>
-                  <a:srgbClr val="1A202C"/>
-                </a:solidFill>
-                <a:latin typeface="Avenir Demi" panose="02000503020000020003" pitchFamily="2" charset="0"/>
-              </a:rPr>
-              <a:t>4. K-</a:t>
-            </a:r>
-            <a:r>
-              <a:rPr lang="en-US" sz="2400" dirty="0" err="1">
-                <a:solidFill>
-                  <a:srgbClr val="1A202C"/>
-                </a:solidFill>
-                <a:latin typeface="Avenir Demi" panose="02000503020000020003" pitchFamily="2" charset="0"/>
-              </a:rPr>
-              <a:t>th</a:t>
-            </a:r>
-            <a:r>
-              <a:rPr lang="en-US" sz="2400" dirty="0">
-                <a:solidFill>
-                  <a:srgbClr val="1A202C"/>
-                </a:solidFill>
-                <a:latin typeface="Avenir Demi" panose="02000503020000020003" pitchFamily="2" charset="0"/>
-              </a:rPr>
-              <a:t> smallest element: Starting at the root, compare k with the size of the left subtree. If equal, return the current node’s value; if less, recurse on the left subtree; otherwise, subtract the left subtree size plus one and recurse on the right subtree.</a:t>
-            </a:r>
-          </a:p>
-        </p:txBody>
-      </p:sp>
-    </p:spTree>
-    <p:extLst>
-      <p:ext uri="{BB962C8B-B14F-4D97-AF65-F5344CB8AC3E}">
-        <p14:creationId xmlns:p14="http://schemas.microsoft.com/office/powerpoint/2010/main" val="3497765117"/>
-      </p:ext>
-    </p:extLst>
-  </p:cSld>
-  <p:clrMapOvr>
-    <a:masterClrMapping/>
-  </p:clrMapOvr>
-</p:sld>
-</file>
-
-<file path=ppt/slides/slide22.xml><?xml version="1.0" encoding="utf-8"?>
-<p:sld xmlns:a="http://schemas.openxmlformats.org/drawingml/2006/main" xmlns:r="http://schemas.openxmlformats.org/officeDocument/2006/relationships" xmlns:p="http://schemas.openxmlformats.org/presentationml/2006/main">
-  <p:cSld>
-    <p:bg>
-      <p:bgPr>
-        <a:blipFill dpi="0" rotWithShape="1">
           <a:blip r:embed="rId2">
             <a:lum/>
           </a:blip>
@@ -16483,7 +15851,7 @@
         </p:nvSpPr>
         <p:spPr>
           <a:xfrm>
-            <a:off x="4432300" y="1968500"/>
+            <a:off x="4432300" y="1981752"/>
             <a:ext cx="6718300" cy="400110"/>
           </a:xfrm>
           <a:prstGeom prst="rect">

</xml_diff>